<commit_message>
visitors statistic slide added
</commit_message>
<xml_diff>
--- a/Presentation.pptx
+++ b/Presentation.pptx
@@ -1784,37 +1784,7 @@
     </mc:Fallback>
   </mc:AlternateContent>
   <c:chart>
-    <c:title>
-      <c:overlay val="0"/>
-      <c:spPr>
-        <a:noFill/>
-        <a:ln>
-          <a:noFill/>
-        </a:ln>
-        <a:effectLst/>
-      </c:spPr>
-      <c:txPr>
-        <a:bodyPr rot="0" spcFirstLastPara="1" vertOverflow="ellipsis" vert="horz" wrap="square" anchor="ctr" anchorCtr="1"/>
-        <a:lstStyle/>
-        <a:p>
-          <a:pPr>
-            <a:defRPr sz="1862" b="0" i="0" u="none" strike="noStrike" kern="1200" spc="0" baseline="0">
-              <a:solidFill>
-                <a:schemeClr val="tx1">
-                  <a:lumMod val="65000"/>
-                  <a:lumOff val="35000"/>
-                </a:schemeClr>
-              </a:solidFill>
-              <a:latin typeface="+mn-lt"/>
-              <a:ea typeface="+mn-ea"/>
-              <a:cs typeface="+mn-cs"/>
-            </a:defRPr>
-          </a:pPr>
-          <a:endParaRPr lang="en-US"/>
-        </a:p>
-      </c:txPr>
-    </c:title>
-    <c:autoTitleDeleted val="0"/>
+    <c:autoTitleDeleted val="1"/>
     <c:plotArea>
       <c:layout/>
       <c:pieChart>
@@ -1847,6 +1817,11 @@
               </a:ln>
               <a:effectLst/>
             </c:spPr>
+            <c:extLst>
+              <c:ext xmlns:c16="http://schemas.microsoft.com/office/drawing/2014/chart" uri="{C3380CC4-5D6E-409C-BE32-E72D297353CC}">
+                <c16:uniqueId val="{00000001-6957-714B-9852-31F8F771829D}"/>
+              </c:ext>
+            </c:extLst>
           </c:dPt>
           <c:dPt>
             <c:idx val="1"/>
@@ -1862,62 +1837,37 @@
               </a:ln>
               <a:effectLst/>
             </c:spPr>
-          </c:dPt>
-          <c:dPt>
-            <c:idx val="2"/>
-            <c:bubble3D val="0"/>
-            <c:spPr>
-              <a:solidFill>
-                <a:schemeClr val="accent3"/>
-              </a:solidFill>
-              <a:ln w="19050">
-                <a:solidFill>
-                  <a:schemeClr val="lt1"/>
-                </a:solidFill>
-              </a:ln>
-              <a:effectLst/>
-            </c:spPr>
-          </c:dPt>
-          <c:dPt>
-            <c:idx val="3"/>
-            <c:bubble3D val="0"/>
-            <c:spPr>
-              <a:solidFill>
-                <a:schemeClr val="accent4"/>
-              </a:solidFill>
-              <a:ln w="19050">
-                <a:solidFill>
-                  <a:schemeClr val="lt1"/>
-                </a:solidFill>
-              </a:ln>
-              <a:effectLst/>
-            </c:spPr>
+            <c:extLst>
+              <c:ext xmlns:c16="http://schemas.microsoft.com/office/drawing/2014/chart" uri="{C3380CC4-5D6E-409C-BE32-E72D297353CC}">
+                <c16:uniqueId val="{00000003-6957-714B-9852-31F8F771829D}"/>
+              </c:ext>
+            </c:extLst>
           </c:dPt>
           <c:cat>
             <c:strRef>
-              <c:f>Sheet1!$A$2:$A$5</c:f>
+              <c:f>Sheet1!$A$2:$A$3</c:f>
               <c:strCache>
                 <c:ptCount val="2"/>
                 <c:pt idx="0">
-                  <c:v>New Visitor</c:v>
+                  <c:v>Unique Visitors</c:v>
                 </c:pt>
                 <c:pt idx="1">
-                  <c:v>Returning Visitor</c:v>
+                  <c:v>Total Visitors</c:v>
                 </c:pt>
               </c:strCache>
             </c:strRef>
           </c:cat>
           <c:val>
             <c:numRef>
-              <c:f>Sheet1!$B$2:$B$5</c:f>
+              <c:f>Sheet1!$B$2:$B$3</c:f>
               <c:numCache>
                 <c:formatCode>General</c:formatCode>
-                <c:ptCount val="4"/>
+                <c:ptCount val="2"/>
                 <c:pt idx="0">
-                  <c:v>8.1999999999999993</c:v>
+                  <c:v>300</c:v>
                 </c:pt>
                 <c:pt idx="1">
-                  <c:v>3.2</c:v>
+                  <c:v>2700</c:v>
                 </c:pt>
               </c:numCache>
             </c:numRef>
@@ -1964,10 +1914,7 @@
           <a:pPr>
             <a:defRPr sz="1197" b="0" i="0" u="none" strike="noStrike" kern="1200" baseline="0">
               <a:solidFill>
-                <a:schemeClr val="tx1">
-                  <a:lumMod val="65000"/>
-                  <a:lumOff val="35000"/>
-                </a:schemeClr>
+                <a:schemeClr val="bg1"/>
               </a:solidFill>
               <a:latin typeface="+mn-lt"/>
               <a:ea typeface="+mn-ea"/>
@@ -7359,7 +7306,7 @@
           <a:p>
             <a:fld id="{50FABAFA-9D90-4B6C-95A1-503043E46FAB}" type="datetimeFigureOut">
               <a:rPr lang="en-US" smtClean="0"/>
-              <a:t>10/26/18</a:t>
+              <a:t>10/27/18</a:t>
             </a:fld>
             <a:endParaRPr lang="en-US"/>
           </a:p>
@@ -7524,7 +7471,7 @@
           <a:p>
             <a:fld id="{AC15EB1F-8DE4-48C3-A804-A05846A4049F}" type="datetimeFigureOut">
               <a:rPr lang="en-US" smtClean="0"/>
-              <a:t>10/26/18</a:t>
+              <a:t>10/27/18</a:t>
             </a:fld>
             <a:endParaRPr lang="en-US"/>
           </a:p>
@@ -8116,7 +8063,7 @@
           <a:p>
             <a:fld id="{CE5E0A0C-FFF2-4105-9F07-796FCC3D8DE3}" type="datetime1">
               <a:rPr lang="en-US" smtClean="0"/>
-              <a:t>10/26/18</a:t>
+              <a:t>10/27/18</a:t>
             </a:fld>
             <a:endParaRPr lang="en-US"/>
           </a:p>
@@ -8342,7 +8289,7 @@
           <a:p>
             <a:fld id="{4A5D68D4-D432-4190-8060-492B59F98A87}" type="datetime1">
               <a:rPr lang="en-US" smtClean="0"/>
-              <a:t>10/26/18</a:t>
+              <a:t>10/27/18</a:t>
             </a:fld>
             <a:endParaRPr lang="en-US"/>
           </a:p>
@@ -8578,7 +8525,7 @@
           <a:p>
             <a:fld id="{5AF4EF83-7D73-495D-9915-41737B990DFC}" type="datetime1">
               <a:rPr lang="en-US" smtClean="0"/>
-              <a:t>10/26/18</a:t>
+              <a:t>10/27/18</a:t>
             </a:fld>
             <a:endParaRPr lang="en-US"/>
           </a:p>
@@ -8915,7 +8862,7 @@
           <a:p>
             <a:fld id="{73DF2905-D7E2-4171-961B-8EB802C66F9A}" type="datetime1">
               <a:rPr lang="en-US" smtClean="0"/>
-              <a:t>10/26/18</a:t>
+              <a:t>10/27/18</a:t>
             </a:fld>
             <a:endParaRPr lang="en-US"/>
           </a:p>
@@ -9178,7 +9125,7 @@
           <a:p>
             <a:fld id="{82C1B47C-16BC-4A9F-9E6E-9D1F33DC8ABD}" type="datetime1">
               <a:rPr lang="en-US" smtClean="0"/>
-              <a:t>10/26/18</a:t>
+              <a:t>10/27/18</a:t>
             </a:fld>
             <a:endParaRPr lang="en-US"/>
           </a:p>
@@ -9594,7 +9541,7 @@
           <a:p>
             <a:fld id="{0C073DF2-DD31-447B-89F4-CEF82A94D7A7}" type="datetime1">
               <a:rPr lang="en-US" smtClean="0"/>
-              <a:t>10/26/18</a:t>
+              <a:t>10/27/18</a:t>
             </a:fld>
             <a:endParaRPr lang="en-US"/>
           </a:p>
@@ -10126,7 +10073,7 @@
           <a:p>
             <a:fld id="{1551BB0C-CFA8-4A1F-9AAE-D6B32E8256E7}" type="datetime1">
               <a:rPr lang="en-US" smtClean="0"/>
-              <a:t>10/26/18</a:t>
+              <a:t>10/27/18</a:t>
             </a:fld>
             <a:endParaRPr lang="en-US"/>
           </a:p>
@@ -10264,7 +10211,7 @@
           <a:p>
             <a:fld id="{2752348D-B72F-4FC3-A127-851C5E7B3A9E}" type="datetime1">
               <a:rPr lang="en-US" smtClean="0"/>
-              <a:t>10/26/18</a:t>
+              <a:t>10/27/18</a:t>
             </a:fld>
             <a:endParaRPr lang="en-US"/>
           </a:p>
@@ -10374,7 +10321,7 @@
           <a:p>
             <a:fld id="{D666EB1B-704A-4D5E-8D5F-456104532486}" type="datetime1">
               <a:rPr lang="en-US" smtClean="0"/>
-              <a:t>10/26/18</a:t>
+              <a:t>10/27/18</a:t>
             </a:fld>
             <a:endParaRPr lang="en-US"/>
           </a:p>
@@ -10687,7 +10634,7 @@
           <a:p>
             <a:fld id="{D96AFBEB-CD4D-45C5-9851-D1FF1EB5AB85}" type="datetime1">
               <a:rPr lang="en-US" smtClean="0"/>
-              <a:t>10/26/18</a:t>
+              <a:t>10/27/18</a:t>
             </a:fld>
             <a:endParaRPr lang="en-US"/>
           </a:p>
@@ -10935,7 +10882,7 @@
           <a:p>
             <a:fld id="{B285B7EB-0ACD-4247-AA3F-1B0B49109B84}" type="datetime1">
               <a:rPr lang="en-US" smtClean="0"/>
-              <a:t>10/26/18</a:t>
+              <a:t>10/27/18</a:t>
             </a:fld>
             <a:endParaRPr lang="en-US"/>
           </a:p>
@@ -11235,7 +11182,7 @@
             <a:fld id="{8254F2F0-E062-4E41-9176-AEE9734E64AC}" type="datetime1">
               <a:rPr lang="en-US" smtClean="0"/>
               <a:pPr/>
-              <a:t>10/26/18</a:t>
+              <a:t>10/27/18</a:t>
             </a:fld>
             <a:endParaRPr lang="en-US" dirty="0"/>
           </a:p>
@@ -12419,11 +12366,17 @@
             <p:ph type="title"/>
           </p:nvPr>
         </p:nvSpPr>
-        <p:spPr/>
+        <p:spPr>
+          <a:xfrm>
+            <a:off x="812800" y="274638"/>
+            <a:ext cx="10566400" cy="868362"/>
+          </a:xfrm>
+        </p:spPr>
         <p:txBody>
           <a:bodyPr/>
           <a:lstStyle/>
           <a:p>
+            <a:pPr algn="ctr"/>
             <a:r>
               <a:rPr lang="en-US" sz="3200" dirty="0"/>
               <a:t>New vs returning visitors</a:t>
@@ -12447,14 +12400,14 @@
             <p:ph sz="quarter" idx="13"/>
             <p:extLst>
               <p:ext uri="{D42A27DB-BD31-4B8C-83A1-F6EECF244321}">
-                <p14:modId xmlns:p14="http://schemas.microsoft.com/office/powerpoint/2010/main" val="134509594"/>
+                <p14:modId xmlns:p14="http://schemas.microsoft.com/office/powerpoint/2010/main" val="1626684850"/>
               </p:ext>
             </p:extLst>
           </p:nvPr>
         </p:nvGraphicFramePr>
         <p:xfrm>
-          <a:off x="812800" y="1600200"/>
-          <a:ext cx="10566400" cy="4114800"/>
+          <a:off x="4137102" y="1600200"/>
+          <a:ext cx="4728118" cy="4114800"/>
         </p:xfrm>
         <a:graphic>
           <a:graphicData uri="http://schemas.openxmlformats.org/drawingml/2006/chart">
@@ -12462,6 +12415,326 @@
           </a:graphicData>
         </a:graphic>
       </p:graphicFrame>
+      <p:sp>
+        <p:nvSpPr>
+          <p:cNvPr id="5" name="TextBox 1">
+            <a:extLst>
+              <a:ext uri="{FF2B5EF4-FFF2-40B4-BE49-F238E27FC236}">
+                <a16:creationId xmlns:a16="http://schemas.microsoft.com/office/drawing/2014/main" id="{E8EB58D8-51E3-5243-A9D2-F8131E264BEA}"/>
+              </a:ext>
+            </a:extLst>
+          </p:cNvPr>
+          <p:cNvSpPr txBox="1"/>
+          <p:nvPr/>
+        </p:nvSpPr>
+        <p:spPr>
+          <a:xfrm>
+            <a:off x="2141033" y="4910881"/>
+            <a:ext cx="2631688" cy="338554"/>
+          </a:xfrm>
+          <a:prstGeom prst="rect">
+            <a:avLst/>
+          </a:prstGeom>
+          <a:noFill/>
+          <a:ln>
+            <a:noFill/>
+          </a:ln>
+        </p:spPr>
+        <p:txBody>
+          <a:bodyPr wrap="square" rtlCol="0" anchor="ctr" anchorCtr="1">
+            <a:spAutoFit/>
+          </a:bodyPr>
+          <a:lstStyle>
+            <a:lvl1pPr marL="0" indent="0">
+              <a:defRPr sz="1100">
+                <a:latin typeface="+mn-lt"/>
+                <a:ea typeface="+mn-ea"/>
+                <a:cs typeface="+mn-cs"/>
+              </a:defRPr>
+            </a:lvl1pPr>
+            <a:lvl2pPr marL="457200" indent="0">
+              <a:defRPr sz="1100">
+                <a:latin typeface="+mn-lt"/>
+                <a:ea typeface="+mn-ea"/>
+                <a:cs typeface="+mn-cs"/>
+              </a:defRPr>
+            </a:lvl2pPr>
+            <a:lvl3pPr marL="914400" indent="0">
+              <a:defRPr sz="1100">
+                <a:latin typeface="+mn-lt"/>
+                <a:ea typeface="+mn-ea"/>
+                <a:cs typeface="+mn-cs"/>
+              </a:defRPr>
+            </a:lvl3pPr>
+            <a:lvl4pPr marL="1371600" indent="0">
+              <a:defRPr sz="1100">
+                <a:latin typeface="+mn-lt"/>
+                <a:ea typeface="+mn-ea"/>
+                <a:cs typeface="+mn-cs"/>
+              </a:defRPr>
+            </a:lvl4pPr>
+            <a:lvl5pPr marL="1828800" indent="0">
+              <a:defRPr sz="1100">
+                <a:latin typeface="+mn-lt"/>
+                <a:ea typeface="+mn-ea"/>
+                <a:cs typeface="+mn-cs"/>
+              </a:defRPr>
+            </a:lvl5pPr>
+            <a:lvl6pPr marL="2286000" indent="0">
+              <a:defRPr sz="1100">
+                <a:latin typeface="+mn-lt"/>
+                <a:ea typeface="+mn-ea"/>
+                <a:cs typeface="+mn-cs"/>
+              </a:defRPr>
+            </a:lvl6pPr>
+            <a:lvl7pPr marL="2743200" indent="0">
+              <a:defRPr sz="1100">
+                <a:latin typeface="+mn-lt"/>
+                <a:ea typeface="+mn-ea"/>
+                <a:cs typeface="+mn-cs"/>
+              </a:defRPr>
+            </a:lvl7pPr>
+            <a:lvl8pPr marL="3200400" indent="0">
+              <a:defRPr sz="1100">
+                <a:latin typeface="+mn-lt"/>
+                <a:ea typeface="+mn-ea"/>
+                <a:cs typeface="+mn-cs"/>
+              </a:defRPr>
+            </a:lvl8pPr>
+            <a:lvl9pPr marL="3657600" indent="0">
+              <a:defRPr sz="1100">
+                <a:latin typeface="+mn-lt"/>
+                <a:ea typeface="+mn-ea"/>
+                <a:cs typeface="+mn-cs"/>
+              </a:defRPr>
+            </a:lvl9pPr>
+          </a:lstStyle>
+          <a:p>
+            <a:r>
+              <a:rPr lang="en-US" sz="1600" dirty="0"/>
+              <a:t>90% Returning Visitors</a:t>
+            </a:r>
+          </a:p>
+        </p:txBody>
+      </p:sp>
+      <p:sp>
+        <p:nvSpPr>
+          <p:cNvPr id="6" name="TextBox 1">
+            <a:extLst>
+              <a:ext uri="{FF2B5EF4-FFF2-40B4-BE49-F238E27FC236}">
+                <a16:creationId xmlns:a16="http://schemas.microsoft.com/office/drawing/2014/main" id="{14CD36C7-B7EA-F94C-BEA1-3D7920CCA182}"/>
+              </a:ext>
+            </a:extLst>
+          </p:cNvPr>
+          <p:cNvSpPr txBox="1"/>
+          <p:nvPr/>
+        </p:nvSpPr>
+        <p:spPr>
+          <a:xfrm>
+            <a:off x="8538100" y="1516568"/>
+            <a:ext cx="2161494" cy="338554"/>
+          </a:xfrm>
+          <a:prstGeom prst="rect">
+            <a:avLst/>
+          </a:prstGeom>
+          <a:noFill/>
+          <a:ln>
+            <a:noFill/>
+          </a:ln>
+        </p:spPr>
+        <p:txBody>
+          <a:bodyPr wrap="square" rtlCol="0" anchor="ctr" anchorCtr="1">
+            <a:spAutoFit/>
+          </a:bodyPr>
+          <a:lstStyle>
+            <a:lvl1pPr marL="0" indent="0">
+              <a:defRPr sz="1100">
+                <a:latin typeface="+mn-lt"/>
+                <a:ea typeface="+mn-ea"/>
+                <a:cs typeface="+mn-cs"/>
+              </a:defRPr>
+            </a:lvl1pPr>
+            <a:lvl2pPr marL="457200" indent="0">
+              <a:defRPr sz="1100">
+                <a:latin typeface="+mn-lt"/>
+                <a:ea typeface="+mn-ea"/>
+                <a:cs typeface="+mn-cs"/>
+              </a:defRPr>
+            </a:lvl2pPr>
+            <a:lvl3pPr marL="914400" indent="0">
+              <a:defRPr sz="1100">
+                <a:latin typeface="+mn-lt"/>
+                <a:ea typeface="+mn-ea"/>
+                <a:cs typeface="+mn-cs"/>
+              </a:defRPr>
+            </a:lvl3pPr>
+            <a:lvl4pPr marL="1371600" indent="0">
+              <a:defRPr sz="1100">
+                <a:latin typeface="+mn-lt"/>
+                <a:ea typeface="+mn-ea"/>
+                <a:cs typeface="+mn-cs"/>
+              </a:defRPr>
+            </a:lvl4pPr>
+            <a:lvl5pPr marL="1828800" indent="0">
+              <a:defRPr sz="1100">
+                <a:latin typeface="+mn-lt"/>
+                <a:ea typeface="+mn-ea"/>
+                <a:cs typeface="+mn-cs"/>
+              </a:defRPr>
+            </a:lvl5pPr>
+            <a:lvl6pPr marL="2286000" indent="0">
+              <a:defRPr sz="1100">
+                <a:latin typeface="+mn-lt"/>
+                <a:ea typeface="+mn-ea"/>
+                <a:cs typeface="+mn-cs"/>
+              </a:defRPr>
+            </a:lvl6pPr>
+            <a:lvl7pPr marL="2743200" indent="0">
+              <a:defRPr sz="1100">
+                <a:latin typeface="+mn-lt"/>
+                <a:ea typeface="+mn-ea"/>
+                <a:cs typeface="+mn-cs"/>
+              </a:defRPr>
+            </a:lvl7pPr>
+            <a:lvl8pPr marL="3200400" indent="0">
+              <a:defRPr sz="1100">
+                <a:latin typeface="+mn-lt"/>
+                <a:ea typeface="+mn-ea"/>
+                <a:cs typeface="+mn-cs"/>
+              </a:defRPr>
+            </a:lvl8pPr>
+            <a:lvl9pPr marL="3657600" indent="0">
+              <a:defRPr sz="1100">
+                <a:latin typeface="+mn-lt"/>
+                <a:ea typeface="+mn-ea"/>
+                <a:cs typeface="+mn-cs"/>
+              </a:defRPr>
+            </a:lvl9pPr>
+          </a:lstStyle>
+          <a:p>
+            <a:r>
+              <a:rPr lang="en-US" sz="1600" dirty="0"/>
+              <a:t>10% Unique Visitors</a:t>
+            </a:r>
+          </a:p>
+        </p:txBody>
+      </p:sp>
+      <p:cxnSp>
+        <p:nvCxnSpPr>
+          <p:cNvPr id="7" name="Straight Connector 6">
+            <a:extLst>
+              <a:ext uri="{FF2B5EF4-FFF2-40B4-BE49-F238E27FC236}">
+                <a16:creationId xmlns:a16="http://schemas.microsoft.com/office/drawing/2014/main" id="{5683F1C4-C1D9-D540-B88B-D71141468AD6}"/>
+              </a:ext>
+            </a:extLst>
+          </p:cNvPr>
+          <p:cNvCxnSpPr>
+            <a:cxnSpLocks/>
+          </p:cNvCxnSpPr>
+          <p:nvPr/>
+        </p:nvCxnSpPr>
+        <p:spPr>
+          <a:xfrm>
+            <a:off x="7103325" y="1819657"/>
+            <a:ext cx="3445729" cy="0"/>
+          </a:xfrm>
+          <a:prstGeom prst="line">
+            <a:avLst/>
+          </a:prstGeom>
+          <a:ln w="25400"/>
+        </p:spPr>
+        <p:style>
+          <a:lnRef idx="1">
+            <a:schemeClr val="accent2"/>
+          </a:lnRef>
+          <a:fillRef idx="0">
+            <a:schemeClr val="accent2"/>
+          </a:fillRef>
+          <a:effectRef idx="0">
+            <a:schemeClr val="accent2"/>
+          </a:effectRef>
+          <a:fontRef idx="minor">
+            <a:schemeClr val="tx1"/>
+          </a:fontRef>
+        </p:style>
+      </p:cxnSp>
+      <p:cxnSp>
+        <p:nvCxnSpPr>
+          <p:cNvPr id="10" name="Straight Connector 9">
+            <a:extLst>
+              <a:ext uri="{FF2B5EF4-FFF2-40B4-BE49-F238E27FC236}">
+                <a16:creationId xmlns:a16="http://schemas.microsoft.com/office/drawing/2014/main" id="{7A94DA74-9BFC-7E4C-9684-90740F367CD1}"/>
+              </a:ext>
+            </a:extLst>
+          </p:cNvPr>
+          <p:cNvCxnSpPr>
+            <a:cxnSpLocks/>
+          </p:cNvCxnSpPr>
+          <p:nvPr/>
+        </p:nvCxnSpPr>
+        <p:spPr>
+          <a:xfrm flipH="1">
+            <a:off x="2408663" y="5235496"/>
+            <a:ext cx="3687338" cy="0"/>
+          </a:xfrm>
+          <a:prstGeom prst="line">
+            <a:avLst/>
+          </a:prstGeom>
+          <a:ln w="25400"/>
+        </p:spPr>
+        <p:style>
+          <a:lnRef idx="1">
+            <a:schemeClr val="accent2"/>
+          </a:lnRef>
+          <a:fillRef idx="0">
+            <a:schemeClr val="accent2"/>
+          </a:fillRef>
+          <a:effectRef idx="0">
+            <a:schemeClr val="accent2"/>
+          </a:effectRef>
+          <a:fontRef idx="minor">
+            <a:schemeClr val="tx1"/>
+          </a:fontRef>
+        </p:style>
+      </p:cxnSp>
+      <p:sp>
+        <p:nvSpPr>
+          <p:cNvPr id="14" name="TextBox 13">
+            <a:extLst>
+              <a:ext uri="{FF2B5EF4-FFF2-40B4-BE49-F238E27FC236}">
+                <a16:creationId xmlns:a16="http://schemas.microsoft.com/office/drawing/2014/main" id="{AEE4083A-C03E-374C-B01F-D10753A2E32F}"/>
+              </a:ext>
+            </a:extLst>
+          </p:cNvPr>
+          <p:cNvSpPr txBox="1"/>
+          <p:nvPr/>
+        </p:nvSpPr>
+        <p:spPr>
+          <a:xfrm>
+            <a:off x="5319132" y="3451302"/>
+            <a:ext cx="2341756" cy="369332"/>
+          </a:xfrm>
+          <a:prstGeom prst="rect">
+            <a:avLst/>
+          </a:prstGeom>
+          <a:noFill/>
+          <a:ln>
+            <a:noFill/>
+          </a:ln>
+        </p:spPr>
+        <p:txBody>
+          <a:bodyPr wrap="square" rtlCol="0" anchor="ctr" anchorCtr="1">
+            <a:spAutoFit/>
+          </a:bodyPr>
+          <a:lstStyle/>
+          <a:p>
+            <a:r>
+              <a:rPr lang="en-US" dirty="0"/>
+              <a:t>Total 3000 Visitors</a:t>
+            </a:r>
+          </a:p>
+        </p:txBody>
+      </p:sp>
     </p:spTree>
     <p:extLst>
       <p:ext uri="{BB962C8B-B14F-4D97-AF65-F5344CB8AC3E}">
@@ -13827,6 +14100,15 @@
 </file>
 
 <file path=customXml/item1.xml><?xml version="1.0" encoding="utf-8"?>
+<?mso-contentType ?>
+<FormTemplates xmlns="http://schemas.microsoft.com/sharepoint/v3/contenttype/forms">
+  <Display>DocumentLibraryForm</Display>
+  <Edit>DocumentLibraryForm</Edit>
+  <New>DocumentLibraryForm</New>
+</FormTemplates>
+</file>
+
+<file path=customXml/item2.xml><?xml version="1.0" encoding="utf-8"?>
 <ct:contentTypeSchema xmlns:ct="http://schemas.microsoft.com/office/2006/metadata/contentType" xmlns:ma="http://schemas.microsoft.com/office/2006/metadata/properties/metaAttributes" ct:_="" ma:_="" ma:contentTypeName="Document" ma:contentTypeID="0x010100AA3F7D94069FF64A86F7DFF56D60E3BE" ma:contentTypeVersion="6" ma:contentTypeDescription="Create a new document." ma:contentTypeScope="" ma:versionID="c32302c77d4085ecf495bdddb7f5e889">
   <xsd:schema xmlns:xsd="http://www.w3.org/2001/XMLSchema" xmlns:xs="http://www.w3.org/2001/XMLSchema" xmlns:p="http://schemas.microsoft.com/office/2006/metadata/properties" xmlns:ns2="a4f35948-e619-41b3-aa29-22878b09cfd2" xmlns:ns3="40262f94-9f35-4ac3-9a90-690165a166b7" targetNamespace="http://schemas.microsoft.com/office/2006/metadata/properties" ma:root="true" ma:fieldsID="4ab5ae46be95f9d0be6107e8200be7a2" ns2:_="" ns3:_="">
     <xsd:import namespace="a4f35948-e619-41b3-aa29-22878b09cfd2"/>
@@ -14007,15 +14289,6 @@
 </ct:contentTypeSchema>
 </file>
 
-<file path=customXml/item2.xml><?xml version="1.0" encoding="utf-8"?>
-<?mso-contentType ?>
-<FormTemplates xmlns="http://schemas.microsoft.com/sharepoint/v3/contenttype/forms">
-  <Display>DocumentLibraryForm</Display>
-  <Edit>DocumentLibraryForm</Edit>
-  <New>DocumentLibraryForm</New>
-</FormTemplates>
-</file>
-
 <file path=customXml/item3.xml><?xml version="1.0" encoding="utf-8"?>
 <p:properties xmlns:p="http://schemas.microsoft.com/office/2006/metadata/properties" xmlns:xsi="http://www.w3.org/2001/XMLSchema-instance" xmlns:pc="http://schemas.microsoft.com/office/infopath/2007/PartnerControls">
   <documentManagement>
@@ -14028,6 +14301,14 @@
 </file>
 
 <file path=customXml/itemProps1.xml><?xml version="1.0" encoding="utf-8"?>
+<ds:datastoreItem xmlns:ds="http://schemas.openxmlformats.org/officeDocument/2006/customXml" ds:itemID="{BED6C63E-22D9-40FD-AF90-6F5632A4309F}">
+  <ds:schemaRefs>
+    <ds:schemaRef ds:uri="http://schemas.microsoft.com/sharepoint/v3/contenttype/forms"/>
+  </ds:schemaRefs>
+</ds:datastoreItem>
+</file>
+
+<file path=customXml/itemProps2.xml><?xml version="1.0" encoding="utf-8"?>
 <ds:datastoreItem xmlns:ds="http://schemas.openxmlformats.org/officeDocument/2006/customXml" ds:itemID="{CF195433-C13C-4992-BB9A-17B0DB253FA6}">
   <ds:schemaRefs>
     <ds:schemaRef ds:uri="http://schemas.microsoft.com/office/2006/metadata/contentType"/>
@@ -14042,14 +14323,6 @@
     <ds:schemaRef ds:uri="http://purl.org/dc/elements/1.1/"/>
     <ds:schemaRef ds:uri="http://purl.org/dc/terms/"/>
     <ds:schemaRef ds:uri="http://schemas.microsoft.com/internal/obd"/>
-  </ds:schemaRefs>
-</ds:datastoreItem>
-</file>
-
-<file path=customXml/itemProps2.xml><?xml version="1.0" encoding="utf-8"?>
-<ds:datastoreItem xmlns:ds="http://schemas.openxmlformats.org/officeDocument/2006/customXml" ds:itemID="{BED6C63E-22D9-40FD-AF90-6F5632A4309F}">
-  <ds:schemaRefs>
-    <ds:schemaRef ds:uri="http://schemas.microsoft.com/sharepoint/v3/contenttype/forms"/>
   </ds:schemaRefs>
 </ds:datastoreItem>
 </file>

</xml_diff>